<commit_message>
Bit fix of Presentation.pptx - year and name of the game
</commit_message>
<xml_diff>
--- a/Resources/Presentation.pptx
+++ b/Resources/Presentation.pptx
@@ -154,7 +154,7 @@
   </p:defaultTextStyle>
   <p:extLst>
     <p:ext uri="{EFAFB233-063F-42B5-8137-9DF3F51BA10A}">
-      <p15:sldGuideLst xmlns="" xmlns:p15="http://schemas.microsoft.com/office/powerpoint/2012/main">
+      <p15:sldGuideLst xmlns:p15="http://schemas.microsoft.com/office/powerpoint/2012/main" xmlns="">
         <p15:guide id="1" orient="horz" pos="2160">
           <p15:clr>
             <a:srgbClr val="A4A3A4"/>
@@ -168,7 +168,7 @@
       </p15:sldGuideLst>
     </p:ext>
     <p:ext uri="{2D200454-40CA-4A62-9FC3-DE9A4176ACB9}">
-      <p15:notesGuideLst xmlns="" xmlns:p15="http://schemas.microsoft.com/office/powerpoint/2012/main">
+      <p15:notesGuideLst xmlns:p15="http://schemas.microsoft.com/office/powerpoint/2012/main" xmlns="">
         <p15:guide id="1" orient="horz" pos="2928">
           <p15:clr>
             <a:srgbClr val="A4A3A4"/>
@@ -408,7 +408,7 @@
     </p:spTree>
     <p:extLst>
       <p:ext uri="{BB962C8B-B14F-4D97-AF65-F5344CB8AC3E}">
-        <p14:creationId xmlns="" xmlns:p14="http://schemas.microsoft.com/office/powerpoint/2010/main" val="1213240605"/>
+        <p14:creationId xmlns:p14="http://schemas.microsoft.com/office/powerpoint/2010/main" xmlns="" val="1213240605"/>
       </p:ext>
     </p:extLst>
   </p:cSld>
@@ -744,7 +744,7 @@
     </p:spTree>
     <p:extLst>
       <p:ext uri="{BB962C8B-B14F-4D97-AF65-F5344CB8AC3E}">
-        <p14:creationId xmlns="" xmlns:p14="http://schemas.microsoft.com/office/powerpoint/2010/main" val="3985201946"/>
+        <p14:creationId xmlns:p14="http://schemas.microsoft.com/office/powerpoint/2010/main" xmlns="" val="3985201946"/>
       </p:ext>
     </p:extLst>
   </p:cSld>
@@ -1004,7 +1004,7 @@
     </p:spTree>
     <p:extLst>
       <p:ext uri="{BB962C8B-B14F-4D97-AF65-F5344CB8AC3E}">
-        <p14:creationId xmlns="" xmlns:p14="http://schemas.microsoft.com/office/powerpoint/2010/main" val="1044534445"/>
+        <p14:creationId xmlns:p14="http://schemas.microsoft.com/office/powerpoint/2010/main" xmlns="" val="1044534445"/>
       </p:ext>
     </p:extLst>
   </p:cSld>
@@ -1144,7 +1144,7 @@
     </p:spTree>
     <p:extLst>
       <p:ext uri="{BB962C8B-B14F-4D97-AF65-F5344CB8AC3E}">
-        <p14:creationId xmlns="" xmlns:p14="http://schemas.microsoft.com/office/powerpoint/2010/main" val="1044534445"/>
+        <p14:creationId xmlns:p14="http://schemas.microsoft.com/office/powerpoint/2010/main" xmlns="" val="1044534445"/>
       </p:ext>
     </p:extLst>
   </p:cSld>
@@ -1284,7 +1284,7 @@
     </p:spTree>
     <p:extLst>
       <p:ext uri="{BB962C8B-B14F-4D97-AF65-F5344CB8AC3E}">
-        <p14:creationId xmlns="" xmlns:p14="http://schemas.microsoft.com/office/powerpoint/2010/main" val="1044534445"/>
+        <p14:creationId xmlns:p14="http://schemas.microsoft.com/office/powerpoint/2010/main" xmlns="" val="1044534445"/>
       </p:ext>
     </p:extLst>
   </p:cSld>
@@ -1424,7 +1424,7 @@
     </p:spTree>
     <p:extLst>
       <p:ext uri="{BB962C8B-B14F-4D97-AF65-F5344CB8AC3E}">
-        <p14:creationId xmlns="" xmlns:p14="http://schemas.microsoft.com/office/powerpoint/2010/main" val="1044534445"/>
+        <p14:creationId xmlns:p14="http://schemas.microsoft.com/office/powerpoint/2010/main" xmlns="" val="1044534445"/>
       </p:ext>
     </p:extLst>
   </p:cSld>
@@ -1564,7 +1564,7 @@
     </p:spTree>
     <p:extLst>
       <p:ext uri="{BB962C8B-B14F-4D97-AF65-F5344CB8AC3E}">
-        <p14:creationId xmlns="" xmlns:p14="http://schemas.microsoft.com/office/powerpoint/2010/main" val="1044534445"/>
+        <p14:creationId xmlns:p14="http://schemas.microsoft.com/office/powerpoint/2010/main" xmlns="" val="1044534445"/>
       </p:ext>
     </p:extLst>
   </p:cSld>
@@ -1704,7 +1704,7 @@
     </p:spTree>
     <p:extLst>
       <p:ext uri="{BB962C8B-B14F-4D97-AF65-F5344CB8AC3E}">
-        <p14:creationId xmlns="" xmlns:p14="http://schemas.microsoft.com/office/powerpoint/2010/main" val="1044534445"/>
+        <p14:creationId xmlns:p14="http://schemas.microsoft.com/office/powerpoint/2010/main" xmlns="" val="1044534445"/>
       </p:ext>
     </p:extLst>
   </p:cSld>
@@ -1844,7 +1844,7 @@
     </p:spTree>
     <p:extLst>
       <p:ext uri="{BB962C8B-B14F-4D97-AF65-F5344CB8AC3E}">
-        <p14:creationId xmlns="" xmlns:p14="http://schemas.microsoft.com/office/powerpoint/2010/main" val="1044534445"/>
+        <p14:creationId xmlns:p14="http://schemas.microsoft.com/office/powerpoint/2010/main" xmlns="" val="1044534445"/>
       </p:ext>
     </p:extLst>
   </p:cSld>
@@ -1984,7 +1984,7 @@
     </p:spTree>
     <p:extLst>
       <p:ext uri="{BB962C8B-B14F-4D97-AF65-F5344CB8AC3E}">
-        <p14:creationId xmlns="" xmlns:p14="http://schemas.microsoft.com/office/powerpoint/2010/main" val="1044534445"/>
+        <p14:creationId xmlns:p14="http://schemas.microsoft.com/office/powerpoint/2010/main" xmlns="" val="1044534445"/>
       </p:ext>
     </p:extLst>
   </p:cSld>
@@ -2124,7 +2124,7 @@
     </p:spTree>
     <p:extLst>
       <p:ext uri="{BB962C8B-B14F-4D97-AF65-F5344CB8AC3E}">
-        <p14:creationId xmlns="" xmlns:p14="http://schemas.microsoft.com/office/powerpoint/2010/main" val="1044534445"/>
+        <p14:creationId xmlns:p14="http://schemas.microsoft.com/office/powerpoint/2010/main" xmlns="" val="1044534445"/>
       </p:ext>
     </p:extLst>
   </p:cSld>
@@ -2264,7 +2264,7 @@
     </p:spTree>
     <p:extLst>
       <p:ext uri="{BB962C8B-B14F-4D97-AF65-F5344CB8AC3E}">
-        <p14:creationId xmlns="" xmlns:p14="http://schemas.microsoft.com/office/powerpoint/2010/main" val="1044534445"/>
+        <p14:creationId xmlns:p14="http://schemas.microsoft.com/office/powerpoint/2010/main" xmlns="" val="1044534445"/>
       </p:ext>
     </p:extLst>
   </p:cSld>
@@ -2404,7 +2404,7 @@
     </p:spTree>
     <p:extLst>
       <p:ext uri="{BB962C8B-B14F-4D97-AF65-F5344CB8AC3E}">
-        <p14:creationId xmlns="" xmlns:p14="http://schemas.microsoft.com/office/powerpoint/2010/main" val="1044534445"/>
+        <p14:creationId xmlns:p14="http://schemas.microsoft.com/office/powerpoint/2010/main" xmlns="" val="1044534445"/>
       </p:ext>
     </p:extLst>
   </p:cSld>
@@ -2544,7 +2544,7 @@
     </p:spTree>
     <p:extLst>
       <p:ext uri="{BB962C8B-B14F-4D97-AF65-F5344CB8AC3E}">
-        <p14:creationId xmlns="" xmlns:p14="http://schemas.microsoft.com/office/powerpoint/2010/main" val="1044534445"/>
+        <p14:creationId xmlns:p14="http://schemas.microsoft.com/office/powerpoint/2010/main" xmlns="" val="1044534445"/>
       </p:ext>
     </p:extLst>
   </p:cSld>
@@ -3691,7 +3691,7 @@
     </p:spTree>
     <p:extLst>
       <p:ext uri="{BB962C8B-B14F-4D97-AF65-F5344CB8AC3E}">
-        <p14:creationId xmlns="" xmlns:p14="http://schemas.microsoft.com/office/powerpoint/2010/main" val="3141685506"/>
+        <p14:creationId xmlns:p14="http://schemas.microsoft.com/office/powerpoint/2010/main" xmlns="" val="3141685506"/>
       </p:ext>
     </p:extLst>
   </p:cSld>
@@ -6554,10 +6554,10 @@
           <p:nvPr userDrawn="1"/>
         </p:nvPicPr>
         <p:blipFill>
-          <a:blip r:embed="rId7">
+          <a:blip r:embed="rId7" cstate="print">
             <a:extLst>
               <a:ext uri="{28A0092B-C50C-407E-A947-70E740481C1C}">
-                <a14:useLocalDpi xmlns="" xmlns:a14="http://schemas.microsoft.com/office/drawing/2010/main" val="0"/>
+                <a14:useLocalDpi xmlns:a14="http://schemas.microsoft.com/office/drawing/2010/main" xmlns="" val="0"/>
               </a:ext>
             </a:extLst>
           </a:blip>
@@ -6577,7 +6577,7 @@
           <a:noFill/>
           <a:extLst>
             <a:ext uri="{909E8E84-426E-40DD-AFC4-6F175D3DCCD1}">
-              <a14:hiddenFill xmlns="" xmlns:a14="http://schemas.microsoft.com/office/drawing/2010/main">
+              <a14:hiddenFill xmlns:a14="http://schemas.microsoft.com/office/drawing/2010/main" xmlns="">
                 <a:solidFill>
                   <a:srgbClr val="FFFFFF"/>
                 </a:solidFill>
@@ -6598,7 +6598,7 @@
           <a:blip r:embed="rId8" cstate="email">
             <a:extLst>
               <a:ext uri="{28A0092B-C50C-407E-A947-70E740481C1C}">
-                <a14:useLocalDpi xmlns="" xmlns:a14="http://schemas.microsoft.com/office/drawing/2010/main" val="0"/>
+                <a14:useLocalDpi xmlns:a14="http://schemas.microsoft.com/office/drawing/2010/main" xmlns="" val="0"/>
               </a:ext>
             </a:extLst>
           </a:blip>
@@ -6622,14 +6622,14 @@
           <a:effectLst/>
           <a:extLst>
             <a:ext uri="{909E8E84-426E-40DD-AFC4-6F175D3DCCD1}">
-              <a14:hiddenFill xmlns="" xmlns:a14="http://schemas.microsoft.com/office/drawing/2010/main">
+              <a14:hiddenFill xmlns:a14="http://schemas.microsoft.com/office/drawing/2010/main" xmlns="">
                 <a:solidFill>
                   <a:schemeClr val="accent1"/>
                 </a:solidFill>
               </a14:hiddenFill>
             </a:ext>
             <a:ext uri="{91240B29-F687-4F45-9708-019B960494DF}">
-              <a14:hiddenLine xmlns="" xmlns:a14="http://schemas.microsoft.com/office/drawing/2010/main" w="9525">
+              <a14:hiddenLine xmlns:a14="http://schemas.microsoft.com/office/drawing/2010/main" xmlns="" w="9525">
                 <a:solidFill>
                   <a:schemeClr val="tx1"/>
                 </a:solidFill>
@@ -6639,7 +6639,7 @@
               </a14:hiddenLine>
             </a:ext>
             <a:ext uri="{AF507438-7753-43E0-B8FC-AC1667EBCBE1}">
-              <a14:hiddenEffects xmlns="" xmlns:a14="http://schemas.microsoft.com/office/drawing/2010/main">
+              <a14:hiddenEffects xmlns:a14="http://schemas.microsoft.com/office/drawing/2010/main" xmlns="">
                 <a:effectLst>
                   <a:outerShdw dist="35921" dir="2700000" algn="ctr" rotWithShape="0">
                     <a:schemeClr val="bg2"/>
@@ -6662,7 +6662,7 @@
           <a:blip r:embed="rId9" cstate="email">
             <a:extLst>
               <a:ext uri="{28A0092B-C50C-407E-A947-70E740481C1C}">
-                <a14:useLocalDpi xmlns="" xmlns:a14="http://schemas.microsoft.com/office/drawing/2010/main" val="0"/>
+                <a14:useLocalDpi xmlns:a14="http://schemas.microsoft.com/office/drawing/2010/main" xmlns="" val="0"/>
               </a:ext>
             </a:extLst>
           </a:blip>
@@ -6686,14 +6686,14 @@
           <a:effectLst/>
           <a:extLst>
             <a:ext uri="{909E8E84-426E-40DD-AFC4-6F175D3DCCD1}">
-              <a14:hiddenFill xmlns="" xmlns:a14="http://schemas.microsoft.com/office/drawing/2010/main">
+              <a14:hiddenFill xmlns:a14="http://schemas.microsoft.com/office/drawing/2010/main" xmlns="">
                 <a:solidFill>
                   <a:schemeClr val="accent1"/>
                 </a:solidFill>
               </a14:hiddenFill>
             </a:ext>
             <a:ext uri="{91240B29-F687-4F45-9708-019B960494DF}">
-              <a14:hiddenLine xmlns="" xmlns:a14="http://schemas.microsoft.com/office/drawing/2010/main" w="9525">
+              <a14:hiddenLine xmlns:a14="http://schemas.microsoft.com/office/drawing/2010/main" xmlns="" w="9525">
                 <a:solidFill>
                   <a:schemeClr val="tx1"/>
                 </a:solidFill>
@@ -6703,7 +6703,7 @@
               </a14:hiddenLine>
             </a:ext>
             <a:ext uri="{AF507438-7753-43E0-B8FC-AC1667EBCBE1}">
-              <a14:hiddenEffects xmlns="" xmlns:a14="http://schemas.microsoft.com/office/drawing/2010/main">
+              <a14:hiddenEffects xmlns:a14="http://schemas.microsoft.com/office/drawing/2010/main" xmlns="">
                 <a:effectLst>
                   <a:outerShdw dist="35921" dir="2700000" algn="ctr" rotWithShape="0">
                     <a:schemeClr val="bg2"/>
@@ -6723,10 +6723,10 @@
           <p:nvPr userDrawn="1"/>
         </p:nvPicPr>
         <p:blipFill>
-          <a:blip r:embed="rId10">
+          <a:blip r:embed="rId10" cstate="print">
             <a:extLst>
               <a:ext uri="{BEBA8EAE-BF5A-486C-A8C5-ECC9F3942E4B}">
-                <a14:imgProps xmlns="" xmlns:a14="http://schemas.microsoft.com/office/drawing/2010/main">
+                <a14:imgProps xmlns:a14="http://schemas.microsoft.com/office/drawing/2010/main" xmlns="">
                   <a14:imgLayer r:embed="rId11">
                     <a14:imgEffect>
                       <a14:brightnessContrast bright="20000"/>
@@ -6735,7 +6735,7 @@
                 </a14:imgProps>
               </a:ext>
               <a:ext uri="{28A0092B-C50C-407E-A947-70E740481C1C}">
-                <a14:useLocalDpi xmlns="" xmlns:a14="http://schemas.microsoft.com/office/drawing/2010/main" val="0"/>
+                <a14:useLocalDpi xmlns:a14="http://schemas.microsoft.com/office/drawing/2010/main" xmlns="" val="0"/>
               </a:ext>
             </a:extLst>
           </a:blip>
@@ -6763,7 +6763,7 @@
           </a:effectLst>
           <a:extLst>
             <a:ext uri="{909E8E84-426E-40DD-AFC4-6F175D3DCCD1}">
-              <a14:hiddenFill xmlns="" xmlns:a14="http://schemas.microsoft.com/office/drawing/2010/main">
+              <a14:hiddenFill xmlns:a14="http://schemas.microsoft.com/office/drawing/2010/main" xmlns="">
                 <a:solidFill>
                   <a:srgbClr val="FFFFFF"/>
                 </a:solidFill>
@@ -7350,14 +7350,24 @@
           <a:lstStyle/>
           <a:p>
             <a:r>
-              <a:rPr sz="8000" smtClean="0">
+              <a:rPr sz="8000" dirty="0" smtClean="0">
                 <a:solidFill>
                   <a:srgbClr val="FF0000"/>
                 </a:solidFill>
                 <a:effectLst/>
                 <a:latin typeface="Chiller" pitchFamily="82" charset="0"/>
               </a:rPr>
-              <a:t>Five-Cards Draw</a:t>
+              <a:t>Five Card </a:t>
+            </a:r>
+            <a:r>
+              <a:rPr sz="8000" dirty="0" smtClean="0">
+                <a:solidFill>
+                  <a:srgbClr val="FF0000"/>
+                </a:solidFill>
+                <a:effectLst/>
+                <a:latin typeface="Chiller" pitchFamily="82" charset="0"/>
+              </a:rPr>
+              <a:t>Draw</a:t>
             </a:r>
             <a:endParaRPr lang="bg-BG" sz="8000" dirty="0">
               <a:solidFill>
@@ -7377,7 +7387,7 @@
           <p:nvPr/>
         </p:nvPicPr>
         <p:blipFill>
-          <a:blip r:embed="rId2"/>
+          <a:blip r:embed="rId2" cstate="print"/>
           <a:srcRect/>
           <a:stretch>
             <a:fillRect/>
@@ -7754,7 +7764,7 @@
           <p:nvPr/>
         </p:nvPicPr>
         <p:blipFill>
-          <a:blip r:embed="rId3"/>
+          <a:blip r:embed="rId3" cstate="print"/>
           <a:srcRect/>
           <a:stretch>
             <a:fillRect/>
@@ -7774,7 +7784,7 @@
     </p:spTree>
     <p:extLst>
       <p:ext uri="{BB962C8B-B14F-4D97-AF65-F5344CB8AC3E}">
-        <p14:creationId xmlns="" xmlns:p14="http://schemas.microsoft.com/office/powerpoint/2010/main" val="3861154471"/>
+        <p14:creationId xmlns:p14="http://schemas.microsoft.com/office/powerpoint/2010/main" xmlns="" val="3861154471"/>
       </p:ext>
     </p:extLst>
   </p:cSld>
@@ -8186,7 +8196,7 @@
           <p:nvPr/>
         </p:nvPicPr>
         <p:blipFill>
-          <a:blip r:embed="rId3"/>
+          <a:blip r:embed="rId3" cstate="print"/>
           <a:srcRect/>
           <a:stretch>
             <a:fillRect/>
@@ -8206,7 +8216,7 @@
     </p:spTree>
     <p:extLst>
       <p:ext uri="{BB962C8B-B14F-4D97-AF65-F5344CB8AC3E}">
-        <p14:creationId xmlns="" xmlns:p14="http://schemas.microsoft.com/office/powerpoint/2010/main" val="3861154471"/>
+        <p14:creationId xmlns:p14="http://schemas.microsoft.com/office/powerpoint/2010/main" xmlns="" val="3861154471"/>
       </p:ext>
     </p:extLst>
   </p:cSld>
@@ -8582,7 +8592,7 @@
           <p:nvPr/>
         </p:nvPicPr>
         <p:blipFill>
-          <a:blip r:embed="rId3"/>
+          <a:blip r:embed="rId3" cstate="print"/>
           <a:srcRect/>
           <a:stretch>
             <a:fillRect/>
@@ -8602,7 +8612,7 @@
     </p:spTree>
     <p:extLst>
       <p:ext uri="{BB962C8B-B14F-4D97-AF65-F5344CB8AC3E}">
-        <p14:creationId xmlns="" xmlns:p14="http://schemas.microsoft.com/office/powerpoint/2010/main" val="3861154471"/>
+        <p14:creationId xmlns:p14="http://schemas.microsoft.com/office/powerpoint/2010/main" xmlns="" val="3861154471"/>
       </p:ext>
     </p:extLst>
   </p:cSld>
@@ -8694,7 +8704,7 @@
           <p:nvPr/>
         </p:nvPicPr>
         <p:blipFill>
-          <a:blip r:embed="rId3"/>
+          <a:blip r:embed="rId3" cstate="print"/>
           <a:srcRect/>
           <a:stretch>
             <a:fillRect/>
@@ -9042,7 +9052,7 @@
                 </a:solidFill>
                 <a:latin typeface="Chiller" pitchFamily="82" charset="0"/>
               </a:rPr>
-              <a:t>2014</a:t>
+              <a:t>2015</a:t>
             </a:r>
             <a:endParaRPr lang="bg-BG" sz="5400" dirty="0">
               <a:solidFill>
@@ -9061,7 +9071,7 @@
           <p:nvPr/>
         </p:nvPicPr>
         <p:blipFill>
-          <a:blip r:embed="rId4"/>
+          <a:blip r:embed="rId4" cstate="print"/>
           <a:srcRect/>
           <a:stretch>
             <a:fillRect/>
@@ -9081,7 +9091,7 @@
     </p:spTree>
     <p:extLst>
       <p:ext uri="{BB962C8B-B14F-4D97-AF65-F5344CB8AC3E}">
-        <p14:creationId xmlns="" xmlns:p14="http://schemas.microsoft.com/office/powerpoint/2010/main" val="3861154471"/>
+        <p14:creationId xmlns:p14="http://schemas.microsoft.com/office/powerpoint/2010/main" xmlns="" val="3861154471"/>
       </p:ext>
     </p:extLst>
   </p:cSld>
@@ -9235,7 +9245,7 @@
           <p:nvPr/>
         </p:nvPicPr>
         <p:blipFill>
-          <a:blip r:embed="rId3"/>
+          <a:blip r:embed="rId3" cstate="print"/>
           <a:srcRect/>
           <a:stretch>
             <a:fillRect/>
@@ -9255,7 +9265,7 @@
     </p:spTree>
     <p:extLst>
       <p:ext uri="{BB962C8B-B14F-4D97-AF65-F5344CB8AC3E}">
-        <p14:creationId xmlns="" xmlns:p14="http://schemas.microsoft.com/office/powerpoint/2010/main" val="3861154471"/>
+        <p14:creationId xmlns:p14="http://schemas.microsoft.com/office/powerpoint/2010/main" xmlns="" val="3861154471"/>
       </p:ext>
     </p:extLst>
   </p:cSld>
@@ -9614,7 +9624,7 @@
           <p:nvPr/>
         </p:nvPicPr>
         <p:blipFill>
-          <a:blip r:embed="rId3"/>
+          <a:blip r:embed="rId3" cstate="print"/>
           <a:srcRect/>
           <a:stretch>
             <a:fillRect/>
@@ -9634,7 +9644,7 @@
     </p:spTree>
     <p:extLst>
       <p:ext uri="{BB962C8B-B14F-4D97-AF65-F5344CB8AC3E}">
-        <p14:creationId xmlns="" xmlns:p14="http://schemas.microsoft.com/office/powerpoint/2010/main" val="3861154471"/>
+        <p14:creationId xmlns:p14="http://schemas.microsoft.com/office/powerpoint/2010/main" xmlns="" val="3861154471"/>
       </p:ext>
     </p:extLst>
   </p:cSld>
@@ -10002,7 +10012,7 @@
           <p:nvPr/>
         </p:nvPicPr>
         <p:blipFill>
-          <a:blip r:embed="rId3"/>
+          <a:blip r:embed="rId3" cstate="print"/>
           <a:srcRect/>
           <a:stretch>
             <a:fillRect/>
@@ -10022,7 +10032,7 @@
     </p:spTree>
     <p:extLst>
       <p:ext uri="{BB962C8B-B14F-4D97-AF65-F5344CB8AC3E}">
-        <p14:creationId xmlns="" xmlns:p14="http://schemas.microsoft.com/office/powerpoint/2010/main" val="3861154471"/>
+        <p14:creationId xmlns:p14="http://schemas.microsoft.com/office/powerpoint/2010/main" xmlns="" val="3861154471"/>
       </p:ext>
     </p:extLst>
   </p:cSld>
@@ -10327,7 +10337,7 @@
           <p:nvPr/>
         </p:nvPicPr>
         <p:blipFill>
-          <a:blip r:embed="rId3"/>
+          <a:blip r:embed="rId3" cstate="print"/>
           <a:srcRect/>
           <a:stretch>
             <a:fillRect/>
@@ -10347,7 +10357,7 @@
     </p:spTree>
     <p:extLst>
       <p:ext uri="{BB962C8B-B14F-4D97-AF65-F5344CB8AC3E}">
-        <p14:creationId xmlns="" xmlns:p14="http://schemas.microsoft.com/office/powerpoint/2010/main" val="3861154471"/>
+        <p14:creationId xmlns:p14="http://schemas.microsoft.com/office/powerpoint/2010/main" xmlns="" val="3861154471"/>
       </p:ext>
     </p:extLst>
   </p:cSld>
@@ -10533,7 +10543,7 @@
           <p:nvPr/>
         </p:nvPicPr>
         <p:blipFill>
-          <a:blip r:embed="rId3"/>
+          <a:blip r:embed="rId3" cstate="print"/>
           <a:srcRect/>
           <a:stretch>
             <a:fillRect/>
@@ -10553,7 +10563,7 @@
     </p:spTree>
     <p:extLst>
       <p:ext uri="{BB962C8B-B14F-4D97-AF65-F5344CB8AC3E}">
-        <p14:creationId xmlns="" xmlns:p14="http://schemas.microsoft.com/office/powerpoint/2010/main" val="3861154471"/>
+        <p14:creationId xmlns:p14="http://schemas.microsoft.com/office/powerpoint/2010/main" xmlns="" val="3861154471"/>
       </p:ext>
     </p:extLst>
   </p:cSld>
@@ -10795,7 +10805,7 @@
           <p:nvPr/>
         </p:nvPicPr>
         <p:blipFill>
-          <a:blip r:embed="rId3"/>
+          <a:blip r:embed="rId3" cstate="print"/>
           <a:srcRect/>
           <a:stretch>
             <a:fillRect/>
@@ -10815,7 +10825,7 @@
     </p:spTree>
     <p:extLst>
       <p:ext uri="{BB962C8B-B14F-4D97-AF65-F5344CB8AC3E}">
-        <p14:creationId xmlns="" xmlns:p14="http://schemas.microsoft.com/office/powerpoint/2010/main" val="3861154471"/>
+        <p14:creationId xmlns:p14="http://schemas.microsoft.com/office/powerpoint/2010/main" xmlns="" val="3861154471"/>
       </p:ext>
     </p:extLst>
   </p:cSld>
@@ -11052,7 +11062,7 @@
           <p:nvPr/>
         </p:nvPicPr>
         <p:blipFill>
-          <a:blip r:embed="rId3"/>
+          <a:blip r:embed="rId3" cstate="print"/>
           <a:srcRect/>
           <a:stretch>
             <a:fillRect/>
@@ -11072,7 +11082,7 @@
     </p:spTree>
     <p:extLst>
       <p:ext uri="{BB962C8B-B14F-4D97-AF65-F5344CB8AC3E}">
-        <p14:creationId xmlns="" xmlns:p14="http://schemas.microsoft.com/office/powerpoint/2010/main" val="3861154471"/>
+        <p14:creationId xmlns:p14="http://schemas.microsoft.com/office/powerpoint/2010/main" xmlns="" val="3861154471"/>
       </p:ext>
     </p:extLst>
   </p:cSld>
@@ -11362,7 +11372,7 @@
           <p:nvPr/>
         </p:nvPicPr>
         <p:blipFill>
-          <a:blip r:embed="rId3"/>
+          <a:blip r:embed="rId3" cstate="print"/>
           <a:srcRect/>
           <a:stretch>
             <a:fillRect/>
@@ -11382,7 +11392,7 @@
     </p:spTree>
     <p:extLst>
       <p:ext uri="{BB962C8B-B14F-4D97-AF65-F5344CB8AC3E}">
-        <p14:creationId xmlns="" xmlns:p14="http://schemas.microsoft.com/office/powerpoint/2010/main" val="3861154471"/>
+        <p14:creationId xmlns:p14="http://schemas.microsoft.com/office/powerpoint/2010/main" xmlns="" val="3861154471"/>
       </p:ext>
     </p:extLst>
   </p:cSld>

</xml_diff>

<commit_message>
link works as one now
</commit_message>
<xml_diff>
--- a/Resources/Presentation.pptx
+++ b/Resources/Presentation.pptx
@@ -154,7 +154,7 @@
   </p:defaultTextStyle>
   <p:extLst>
     <p:ext uri="{EFAFB233-063F-42B5-8137-9DF3F51BA10A}">
-      <p15:sldGuideLst xmlns:p15="http://schemas.microsoft.com/office/powerpoint/2012/main" xmlns="">
+      <p15:sldGuideLst xmlns="" xmlns:p15="http://schemas.microsoft.com/office/powerpoint/2012/main">
         <p15:guide id="1" orient="horz" pos="2160">
           <p15:clr>
             <a:srgbClr val="A4A3A4"/>
@@ -168,7 +168,7 @@
       </p15:sldGuideLst>
     </p:ext>
     <p:ext uri="{2D200454-40CA-4A62-9FC3-DE9A4176ACB9}">
-      <p15:notesGuideLst xmlns:p15="http://schemas.microsoft.com/office/powerpoint/2012/main" xmlns="">
+      <p15:notesGuideLst xmlns="" xmlns:p15="http://schemas.microsoft.com/office/powerpoint/2012/main">
         <p15:guide id="1" orient="horz" pos="2928">
           <p15:clr>
             <a:srgbClr val="A4A3A4"/>
@@ -408,7 +408,7 @@
     </p:spTree>
     <p:extLst>
       <p:ext uri="{BB962C8B-B14F-4D97-AF65-F5344CB8AC3E}">
-        <p14:creationId xmlns:p14="http://schemas.microsoft.com/office/powerpoint/2010/main" xmlns="" val="1213240605"/>
+        <p14:creationId xmlns="" xmlns:p14="http://schemas.microsoft.com/office/powerpoint/2010/main" val="1213240605"/>
       </p:ext>
     </p:extLst>
   </p:cSld>
@@ -744,7 +744,7 @@
     </p:spTree>
     <p:extLst>
       <p:ext uri="{BB962C8B-B14F-4D97-AF65-F5344CB8AC3E}">
-        <p14:creationId xmlns:p14="http://schemas.microsoft.com/office/powerpoint/2010/main" xmlns="" val="3985201946"/>
+        <p14:creationId xmlns="" xmlns:p14="http://schemas.microsoft.com/office/powerpoint/2010/main" val="3985201946"/>
       </p:ext>
     </p:extLst>
   </p:cSld>
@@ -1004,7 +1004,7 @@
     </p:spTree>
     <p:extLst>
       <p:ext uri="{BB962C8B-B14F-4D97-AF65-F5344CB8AC3E}">
-        <p14:creationId xmlns:p14="http://schemas.microsoft.com/office/powerpoint/2010/main" xmlns="" val="1044534445"/>
+        <p14:creationId xmlns="" xmlns:p14="http://schemas.microsoft.com/office/powerpoint/2010/main" val="1044534445"/>
       </p:ext>
     </p:extLst>
   </p:cSld>
@@ -1144,7 +1144,7 @@
     </p:spTree>
     <p:extLst>
       <p:ext uri="{BB962C8B-B14F-4D97-AF65-F5344CB8AC3E}">
-        <p14:creationId xmlns:p14="http://schemas.microsoft.com/office/powerpoint/2010/main" xmlns="" val="1044534445"/>
+        <p14:creationId xmlns="" xmlns:p14="http://schemas.microsoft.com/office/powerpoint/2010/main" val="1044534445"/>
       </p:ext>
     </p:extLst>
   </p:cSld>
@@ -1284,7 +1284,7 @@
     </p:spTree>
     <p:extLst>
       <p:ext uri="{BB962C8B-B14F-4D97-AF65-F5344CB8AC3E}">
-        <p14:creationId xmlns:p14="http://schemas.microsoft.com/office/powerpoint/2010/main" xmlns="" val="1044534445"/>
+        <p14:creationId xmlns="" xmlns:p14="http://schemas.microsoft.com/office/powerpoint/2010/main" val="1044534445"/>
       </p:ext>
     </p:extLst>
   </p:cSld>
@@ -1424,7 +1424,7 @@
     </p:spTree>
     <p:extLst>
       <p:ext uri="{BB962C8B-B14F-4D97-AF65-F5344CB8AC3E}">
-        <p14:creationId xmlns:p14="http://schemas.microsoft.com/office/powerpoint/2010/main" xmlns="" val="1044534445"/>
+        <p14:creationId xmlns="" xmlns:p14="http://schemas.microsoft.com/office/powerpoint/2010/main" val="1044534445"/>
       </p:ext>
     </p:extLst>
   </p:cSld>
@@ -1564,7 +1564,7 @@
     </p:spTree>
     <p:extLst>
       <p:ext uri="{BB962C8B-B14F-4D97-AF65-F5344CB8AC3E}">
-        <p14:creationId xmlns:p14="http://schemas.microsoft.com/office/powerpoint/2010/main" xmlns="" val="1044534445"/>
+        <p14:creationId xmlns="" xmlns:p14="http://schemas.microsoft.com/office/powerpoint/2010/main" val="1044534445"/>
       </p:ext>
     </p:extLst>
   </p:cSld>
@@ -1704,7 +1704,7 @@
     </p:spTree>
     <p:extLst>
       <p:ext uri="{BB962C8B-B14F-4D97-AF65-F5344CB8AC3E}">
-        <p14:creationId xmlns:p14="http://schemas.microsoft.com/office/powerpoint/2010/main" xmlns="" val="1044534445"/>
+        <p14:creationId xmlns="" xmlns:p14="http://schemas.microsoft.com/office/powerpoint/2010/main" val="1044534445"/>
       </p:ext>
     </p:extLst>
   </p:cSld>
@@ -1844,7 +1844,7 @@
     </p:spTree>
     <p:extLst>
       <p:ext uri="{BB962C8B-B14F-4D97-AF65-F5344CB8AC3E}">
-        <p14:creationId xmlns:p14="http://schemas.microsoft.com/office/powerpoint/2010/main" xmlns="" val="1044534445"/>
+        <p14:creationId xmlns="" xmlns:p14="http://schemas.microsoft.com/office/powerpoint/2010/main" val="1044534445"/>
       </p:ext>
     </p:extLst>
   </p:cSld>
@@ -1984,7 +1984,7 @@
     </p:spTree>
     <p:extLst>
       <p:ext uri="{BB962C8B-B14F-4D97-AF65-F5344CB8AC3E}">
-        <p14:creationId xmlns:p14="http://schemas.microsoft.com/office/powerpoint/2010/main" xmlns="" val="1044534445"/>
+        <p14:creationId xmlns="" xmlns:p14="http://schemas.microsoft.com/office/powerpoint/2010/main" val="1044534445"/>
       </p:ext>
     </p:extLst>
   </p:cSld>
@@ -2124,7 +2124,7 @@
     </p:spTree>
     <p:extLst>
       <p:ext uri="{BB962C8B-B14F-4D97-AF65-F5344CB8AC3E}">
-        <p14:creationId xmlns:p14="http://schemas.microsoft.com/office/powerpoint/2010/main" xmlns="" val="1044534445"/>
+        <p14:creationId xmlns="" xmlns:p14="http://schemas.microsoft.com/office/powerpoint/2010/main" val="1044534445"/>
       </p:ext>
     </p:extLst>
   </p:cSld>
@@ -2264,7 +2264,7 @@
     </p:spTree>
     <p:extLst>
       <p:ext uri="{BB962C8B-B14F-4D97-AF65-F5344CB8AC3E}">
-        <p14:creationId xmlns:p14="http://schemas.microsoft.com/office/powerpoint/2010/main" xmlns="" val="1044534445"/>
+        <p14:creationId xmlns="" xmlns:p14="http://schemas.microsoft.com/office/powerpoint/2010/main" val="1044534445"/>
       </p:ext>
     </p:extLst>
   </p:cSld>
@@ -2404,7 +2404,7 @@
     </p:spTree>
     <p:extLst>
       <p:ext uri="{BB962C8B-B14F-4D97-AF65-F5344CB8AC3E}">
-        <p14:creationId xmlns:p14="http://schemas.microsoft.com/office/powerpoint/2010/main" xmlns="" val="1044534445"/>
+        <p14:creationId xmlns="" xmlns:p14="http://schemas.microsoft.com/office/powerpoint/2010/main" val="1044534445"/>
       </p:ext>
     </p:extLst>
   </p:cSld>
@@ -2544,7 +2544,7 @@
     </p:spTree>
     <p:extLst>
       <p:ext uri="{BB962C8B-B14F-4D97-AF65-F5344CB8AC3E}">
-        <p14:creationId xmlns:p14="http://schemas.microsoft.com/office/powerpoint/2010/main" xmlns="" val="1044534445"/>
+        <p14:creationId xmlns="" xmlns:p14="http://schemas.microsoft.com/office/powerpoint/2010/main" val="1044534445"/>
       </p:ext>
     </p:extLst>
   </p:cSld>
@@ -3691,7 +3691,7 @@
     </p:spTree>
     <p:extLst>
       <p:ext uri="{BB962C8B-B14F-4D97-AF65-F5344CB8AC3E}">
-        <p14:creationId xmlns:p14="http://schemas.microsoft.com/office/powerpoint/2010/main" xmlns="" val="3141685506"/>
+        <p14:creationId xmlns="" xmlns:p14="http://schemas.microsoft.com/office/powerpoint/2010/main" val="3141685506"/>
       </p:ext>
     </p:extLst>
   </p:cSld>
@@ -6557,7 +6557,7 @@
           <a:blip r:embed="rId7" cstate="print">
             <a:extLst>
               <a:ext uri="{28A0092B-C50C-407E-A947-70E740481C1C}">
-                <a14:useLocalDpi xmlns:a14="http://schemas.microsoft.com/office/drawing/2010/main" xmlns="" val="0"/>
+                <a14:useLocalDpi xmlns="" xmlns:a14="http://schemas.microsoft.com/office/drawing/2010/main" val="0"/>
               </a:ext>
             </a:extLst>
           </a:blip>
@@ -6577,7 +6577,7 @@
           <a:noFill/>
           <a:extLst>
             <a:ext uri="{909E8E84-426E-40DD-AFC4-6F175D3DCCD1}">
-              <a14:hiddenFill xmlns:a14="http://schemas.microsoft.com/office/drawing/2010/main" xmlns="">
+              <a14:hiddenFill xmlns="" xmlns:a14="http://schemas.microsoft.com/office/drawing/2010/main">
                 <a:solidFill>
                   <a:srgbClr val="FFFFFF"/>
                 </a:solidFill>
@@ -6598,7 +6598,7 @@
           <a:blip r:embed="rId8" cstate="email">
             <a:extLst>
               <a:ext uri="{28A0092B-C50C-407E-A947-70E740481C1C}">
-                <a14:useLocalDpi xmlns:a14="http://schemas.microsoft.com/office/drawing/2010/main" xmlns="" val="0"/>
+                <a14:useLocalDpi xmlns="" xmlns:a14="http://schemas.microsoft.com/office/drawing/2010/main" val="0"/>
               </a:ext>
             </a:extLst>
           </a:blip>
@@ -6622,14 +6622,14 @@
           <a:effectLst/>
           <a:extLst>
             <a:ext uri="{909E8E84-426E-40DD-AFC4-6F175D3DCCD1}">
-              <a14:hiddenFill xmlns:a14="http://schemas.microsoft.com/office/drawing/2010/main" xmlns="">
+              <a14:hiddenFill xmlns="" xmlns:a14="http://schemas.microsoft.com/office/drawing/2010/main">
                 <a:solidFill>
                   <a:schemeClr val="accent1"/>
                 </a:solidFill>
               </a14:hiddenFill>
             </a:ext>
             <a:ext uri="{91240B29-F687-4F45-9708-019B960494DF}">
-              <a14:hiddenLine xmlns:a14="http://schemas.microsoft.com/office/drawing/2010/main" xmlns="" w="9525">
+              <a14:hiddenLine xmlns="" xmlns:a14="http://schemas.microsoft.com/office/drawing/2010/main" w="9525">
                 <a:solidFill>
                   <a:schemeClr val="tx1"/>
                 </a:solidFill>
@@ -6639,7 +6639,7 @@
               </a14:hiddenLine>
             </a:ext>
             <a:ext uri="{AF507438-7753-43E0-B8FC-AC1667EBCBE1}">
-              <a14:hiddenEffects xmlns:a14="http://schemas.microsoft.com/office/drawing/2010/main" xmlns="">
+              <a14:hiddenEffects xmlns="" xmlns:a14="http://schemas.microsoft.com/office/drawing/2010/main">
                 <a:effectLst>
                   <a:outerShdw dist="35921" dir="2700000" algn="ctr" rotWithShape="0">
                     <a:schemeClr val="bg2"/>
@@ -6662,7 +6662,7 @@
           <a:blip r:embed="rId9" cstate="email">
             <a:extLst>
               <a:ext uri="{28A0092B-C50C-407E-A947-70E740481C1C}">
-                <a14:useLocalDpi xmlns:a14="http://schemas.microsoft.com/office/drawing/2010/main" xmlns="" val="0"/>
+                <a14:useLocalDpi xmlns="" xmlns:a14="http://schemas.microsoft.com/office/drawing/2010/main" val="0"/>
               </a:ext>
             </a:extLst>
           </a:blip>
@@ -6686,14 +6686,14 @@
           <a:effectLst/>
           <a:extLst>
             <a:ext uri="{909E8E84-426E-40DD-AFC4-6F175D3DCCD1}">
-              <a14:hiddenFill xmlns:a14="http://schemas.microsoft.com/office/drawing/2010/main" xmlns="">
+              <a14:hiddenFill xmlns="" xmlns:a14="http://schemas.microsoft.com/office/drawing/2010/main">
                 <a:solidFill>
                   <a:schemeClr val="accent1"/>
                 </a:solidFill>
               </a14:hiddenFill>
             </a:ext>
             <a:ext uri="{91240B29-F687-4F45-9708-019B960494DF}">
-              <a14:hiddenLine xmlns:a14="http://schemas.microsoft.com/office/drawing/2010/main" xmlns="" w="9525">
+              <a14:hiddenLine xmlns="" xmlns:a14="http://schemas.microsoft.com/office/drawing/2010/main" w="9525">
                 <a:solidFill>
                   <a:schemeClr val="tx1"/>
                 </a:solidFill>
@@ -6703,7 +6703,7 @@
               </a14:hiddenLine>
             </a:ext>
             <a:ext uri="{AF507438-7753-43E0-B8FC-AC1667EBCBE1}">
-              <a14:hiddenEffects xmlns:a14="http://schemas.microsoft.com/office/drawing/2010/main" xmlns="">
+              <a14:hiddenEffects xmlns="" xmlns:a14="http://schemas.microsoft.com/office/drawing/2010/main">
                 <a:effectLst>
                   <a:outerShdw dist="35921" dir="2700000" algn="ctr" rotWithShape="0">
                     <a:schemeClr val="bg2"/>
@@ -6726,7 +6726,7 @@
           <a:blip r:embed="rId10" cstate="print">
             <a:extLst>
               <a:ext uri="{BEBA8EAE-BF5A-486C-A8C5-ECC9F3942E4B}">
-                <a14:imgProps xmlns:a14="http://schemas.microsoft.com/office/drawing/2010/main" xmlns="">
+                <a14:imgProps xmlns="" xmlns:a14="http://schemas.microsoft.com/office/drawing/2010/main">
                   <a14:imgLayer r:embed="rId11">
                     <a14:imgEffect>
                       <a14:brightnessContrast bright="20000"/>
@@ -6735,7 +6735,7 @@
                 </a14:imgProps>
               </a:ext>
               <a:ext uri="{28A0092B-C50C-407E-A947-70E740481C1C}">
-                <a14:useLocalDpi xmlns:a14="http://schemas.microsoft.com/office/drawing/2010/main" xmlns="" val="0"/>
+                <a14:useLocalDpi xmlns="" xmlns:a14="http://schemas.microsoft.com/office/drawing/2010/main" val="0"/>
               </a:ext>
             </a:extLst>
           </a:blip>
@@ -6763,7 +6763,7 @@
           </a:effectLst>
           <a:extLst>
             <a:ext uri="{909E8E84-426E-40DD-AFC4-6F175D3DCCD1}">
-              <a14:hiddenFill xmlns:a14="http://schemas.microsoft.com/office/drawing/2010/main" xmlns="">
+              <a14:hiddenFill xmlns="" xmlns:a14="http://schemas.microsoft.com/office/drawing/2010/main">
                 <a:solidFill>
                   <a:srgbClr val="FFFFFF"/>
                 </a:solidFill>
@@ -7357,17 +7357,7 @@
                 <a:effectLst/>
                 <a:latin typeface="Chiller" pitchFamily="82" charset="0"/>
               </a:rPr>
-              <a:t>Five Card </a:t>
-            </a:r>
-            <a:r>
-              <a:rPr sz="8000" dirty="0" smtClean="0">
-                <a:solidFill>
-                  <a:srgbClr val="FF0000"/>
-                </a:solidFill>
-                <a:effectLst/>
-                <a:latin typeface="Chiller" pitchFamily="82" charset="0"/>
-              </a:rPr>
-              <a:t>Draw</a:t>
+              <a:t>Five Card Draw</a:t>
             </a:r>
             <a:endParaRPr lang="bg-BG" sz="8000" dirty="0">
               <a:solidFill>
@@ -7784,7 +7774,7 @@
     </p:spTree>
     <p:extLst>
       <p:ext uri="{BB962C8B-B14F-4D97-AF65-F5344CB8AC3E}">
-        <p14:creationId xmlns:p14="http://schemas.microsoft.com/office/powerpoint/2010/main" xmlns="" val="3861154471"/>
+        <p14:creationId xmlns="" xmlns:p14="http://schemas.microsoft.com/office/powerpoint/2010/main" val="3861154471"/>
       </p:ext>
     </p:extLst>
   </p:cSld>
@@ -8216,7 +8206,7 @@
     </p:spTree>
     <p:extLst>
       <p:ext uri="{BB962C8B-B14F-4D97-AF65-F5344CB8AC3E}">
-        <p14:creationId xmlns:p14="http://schemas.microsoft.com/office/powerpoint/2010/main" xmlns="" val="3861154471"/>
+        <p14:creationId xmlns="" xmlns:p14="http://schemas.microsoft.com/office/powerpoint/2010/main" val="3861154471"/>
       </p:ext>
     </p:extLst>
   </p:cSld>
@@ -8612,7 +8602,7 @@
     </p:spTree>
     <p:extLst>
       <p:ext uri="{BB962C8B-B14F-4D97-AF65-F5344CB8AC3E}">
-        <p14:creationId xmlns:p14="http://schemas.microsoft.com/office/powerpoint/2010/main" xmlns="" val="3861154471"/>
+        <p14:creationId xmlns="" xmlns:p14="http://schemas.microsoft.com/office/powerpoint/2010/main" val="3861154471"/>
       </p:ext>
     </p:extLst>
   </p:cSld>
@@ -8774,7 +8764,7 @@
               <a:tabLst/>
             </a:pPr>
             <a:r>
-              <a:rPr kumimoji="0" sz="3200" b="0" i="0" u="none" strike="noStrike" cap="none" normalizeH="0" smtClean="0">
+              <a:rPr kumimoji="0" sz="3200" b="0" i="0" u="none" strike="noStrike" cap="none" normalizeH="0" dirty="0" smtClean="0">
                 <a:ln>
                   <a:noFill/>
                 </a:ln>
@@ -8788,10 +8778,13 @@
                 <a:latin typeface="Chiller" pitchFamily="82" charset="0"/>
                 <a:cs typeface="Arial" pitchFamily="34" charset="0"/>
               </a:rPr>
-              <a:t>Georgi Yonchev </a:t>
-            </a:r>
-            <a:r>
-              <a:rPr sz="3200" b="0" smtClean="0">
+              <a:t>Georgi </a:t>
+            </a:r>
+            <a:r>
+              <a:rPr kumimoji="0" sz="3200" b="0" i="0" u="none" strike="noStrike" cap="none" normalizeH="0" dirty="0" err="1" smtClean="0">
+                <a:ln>
+                  <a:noFill/>
+                </a:ln>
                 <a:solidFill>
                   <a:schemeClr val="accent2">
                     <a:lumMod val="60000"/>
@@ -8802,10 +8795,10 @@
                 <a:latin typeface="Chiller" pitchFamily="82" charset="0"/>
                 <a:cs typeface="Arial" pitchFamily="34" charset="0"/>
               </a:rPr>
-              <a:t> </a:t>
-            </a:r>
-            <a:r>
-              <a:rPr kumimoji="0" sz="3200" b="0" i="0" u="none" strike="noStrike" cap="none" normalizeH="0" smtClean="0">
+              <a:t>Yonchev</a:t>
+            </a:r>
+            <a:r>
+              <a:rPr kumimoji="0" sz="3200" b="0" i="0" u="none" strike="noStrike" cap="none" normalizeH="0" dirty="0" smtClean="0">
                 <a:ln>
                   <a:noFill/>
                 </a:ln>
@@ -8819,8 +8812,87 @@
                 <a:latin typeface="Chiller" pitchFamily="82" charset="0"/>
                 <a:cs typeface="Arial" pitchFamily="34" charset="0"/>
               </a:rPr>
-              <a:t>a.k.a : g.yonchev</a:t>
-            </a:r>
+              <a:t> </a:t>
+            </a:r>
+            <a:r>
+              <a:rPr sz="3200" b="0" dirty="0" smtClean="0">
+                <a:solidFill>
+                  <a:schemeClr val="accent2">
+                    <a:lumMod val="60000"/>
+                    <a:lumOff val="40000"/>
+                  </a:schemeClr>
+                </a:solidFill>
+                <a:effectLst/>
+                <a:latin typeface="Chiller" pitchFamily="82" charset="0"/>
+                <a:cs typeface="Arial" pitchFamily="34" charset="0"/>
+              </a:rPr>
+              <a:t> </a:t>
+            </a:r>
+            <a:r>
+              <a:rPr kumimoji="0" sz="3200" b="0" i="0" u="none" strike="noStrike" cap="none" normalizeH="0" dirty="0" err="1" smtClean="0">
+                <a:ln>
+                  <a:noFill/>
+                </a:ln>
+                <a:solidFill>
+                  <a:schemeClr val="accent2">
+                    <a:lumMod val="60000"/>
+                    <a:lumOff val="40000"/>
+                  </a:schemeClr>
+                </a:solidFill>
+                <a:effectLst/>
+                <a:latin typeface="Chiller" pitchFamily="82" charset="0"/>
+                <a:cs typeface="Arial" pitchFamily="34" charset="0"/>
+              </a:rPr>
+              <a:t>a.k.a</a:t>
+            </a:r>
+            <a:r>
+              <a:rPr kumimoji="0" sz="3200" b="0" i="0" u="none" strike="noStrike" cap="none" normalizeH="0" dirty="0" smtClean="0">
+                <a:ln>
+                  <a:noFill/>
+                </a:ln>
+                <a:solidFill>
+                  <a:schemeClr val="accent2">
+                    <a:lumMod val="60000"/>
+                    <a:lumOff val="40000"/>
+                  </a:schemeClr>
+                </a:solidFill>
+                <a:effectLst/>
+                <a:latin typeface="Chiller" pitchFamily="82" charset="0"/>
+                <a:cs typeface="Arial" pitchFamily="34" charset="0"/>
+              </a:rPr>
+              <a:t> : </a:t>
+            </a:r>
+            <a:r>
+              <a:rPr kumimoji="0" sz="3200" b="0" i="0" u="none" strike="noStrike" cap="none" normalizeH="0" dirty="0" err="1" smtClean="0">
+                <a:ln>
+                  <a:noFill/>
+                </a:ln>
+                <a:solidFill>
+                  <a:schemeClr val="accent2">
+                    <a:lumMod val="60000"/>
+                    <a:lumOff val="40000"/>
+                  </a:schemeClr>
+                </a:solidFill>
+                <a:effectLst/>
+                <a:latin typeface="Chiller" pitchFamily="82" charset="0"/>
+                <a:cs typeface="Arial" pitchFamily="34" charset="0"/>
+              </a:rPr>
+              <a:t>g.yonchev</a:t>
+            </a:r>
+            <a:endParaRPr kumimoji="0" sz="3200" b="0" i="0" u="none" strike="noStrike" cap="none" normalizeH="0" dirty="0" smtClean="0">
+              <a:ln>
+                <a:noFill/>
+              </a:ln>
+              <a:solidFill>
+                <a:schemeClr val="accent2">
+                  <a:lumMod val="60000"/>
+                  <a:lumOff val="40000"/>
+                </a:schemeClr>
+              </a:solidFill>
+              <a:effectLst/>
+              <a:latin typeface="Chiller" pitchFamily="82" charset="0"/>
+              <a:cs typeface="Arial" pitchFamily="34" charset="0"/>
+            </a:endParaRPr>
           </a:p>
           <a:p>
             <a:pPr marL="0" marR="0" lvl="0" indent="0" algn="l" defTabSz="914400" rtl="0" eaLnBrk="0" fontAlgn="base" latinLnBrk="0" hangingPunct="0">
@@ -8840,7 +8912,7 @@
               <a:tabLst/>
             </a:pPr>
             <a:r>
-              <a:rPr sz="3200" b="0" smtClean="0">
+              <a:rPr sz="3200" b="0" dirty="0" err="1" smtClean="0">
                 <a:solidFill>
                   <a:schemeClr val="accent2">
                     <a:lumMod val="60000"/>
@@ -8851,7 +8923,49 @@
                 <a:latin typeface="Chiller" pitchFamily="82" charset="0"/>
                 <a:cs typeface="Arial" pitchFamily="34" charset="0"/>
               </a:rPr>
-              <a:t>Kiril Kolev       a.k.a : kiko81</a:t>
+              <a:t>Kiril</a:t>
+            </a:r>
+            <a:r>
+              <a:rPr sz="3200" b="0" dirty="0" smtClean="0">
+                <a:solidFill>
+                  <a:schemeClr val="accent2">
+                    <a:lumMod val="60000"/>
+                    <a:lumOff val="40000"/>
+                  </a:schemeClr>
+                </a:solidFill>
+                <a:effectLst/>
+                <a:latin typeface="Chiller" pitchFamily="82" charset="0"/>
+                <a:cs typeface="Arial" pitchFamily="34" charset="0"/>
+              </a:rPr>
+              <a:t> Kolev       </a:t>
+            </a:r>
+            <a:r>
+              <a:rPr sz="3200" b="0" dirty="0" err="1" smtClean="0">
+                <a:solidFill>
+                  <a:schemeClr val="accent2">
+                    <a:lumMod val="60000"/>
+                    <a:lumOff val="40000"/>
+                  </a:schemeClr>
+                </a:solidFill>
+                <a:effectLst/>
+                <a:latin typeface="Chiller" pitchFamily="82" charset="0"/>
+                <a:cs typeface="Arial" pitchFamily="34" charset="0"/>
+              </a:rPr>
+              <a:t>a.k.a</a:t>
+            </a:r>
+            <a:r>
+              <a:rPr sz="3200" b="0" dirty="0" smtClean="0">
+                <a:solidFill>
+                  <a:schemeClr val="accent2">
+                    <a:lumMod val="60000"/>
+                    <a:lumOff val="40000"/>
+                  </a:schemeClr>
+                </a:solidFill>
+                <a:effectLst/>
+                <a:latin typeface="Chiller" pitchFamily="82" charset="0"/>
+                <a:cs typeface="Arial" pitchFamily="34" charset="0"/>
+              </a:rPr>
+              <a:t> : kiko81</a:t>
             </a:r>
           </a:p>
           <a:p>
@@ -8863,7 +8977,7 @@
               <a:buSzTx/>
             </a:pPr>
             <a:r>
-              <a:rPr kumimoji="0" sz="3200" b="0" i="0" u="none" strike="noStrike" cap="none" normalizeH="0" smtClean="0">
+              <a:rPr kumimoji="0" sz="3200" b="0" i="0" u="none" strike="noStrike" cap="none" normalizeH="0" dirty="0" smtClean="0">
                 <a:ln>
                   <a:noFill/>
                 </a:ln>
@@ -8877,8 +8991,107 @@
                 <a:latin typeface="Chiller" pitchFamily="82" charset="0"/>
                 <a:cs typeface="Arial" pitchFamily="34" charset="0"/>
               </a:rPr>
-              <a:t>Vasil Ivanchev   a.k.a : ivantchev</a:t>
-            </a:r>
+              <a:t>Vasil </a:t>
+            </a:r>
+            <a:r>
+              <a:rPr kumimoji="0" sz="3200" b="0" i="0" u="none" strike="noStrike" cap="none" normalizeH="0" dirty="0" err="1" smtClean="0">
+                <a:ln>
+                  <a:noFill/>
+                </a:ln>
+                <a:solidFill>
+                  <a:schemeClr val="accent2">
+                    <a:lumMod val="60000"/>
+                    <a:lumOff val="40000"/>
+                  </a:schemeClr>
+                </a:solidFill>
+                <a:effectLst/>
+                <a:latin typeface="Chiller" pitchFamily="82" charset="0"/>
+                <a:cs typeface="Arial" pitchFamily="34" charset="0"/>
+              </a:rPr>
+              <a:t>Ivanchev</a:t>
+            </a:r>
+            <a:r>
+              <a:rPr kumimoji="0" sz="3200" b="0" i="0" u="none" strike="noStrike" cap="none" normalizeH="0" dirty="0" smtClean="0">
+                <a:ln>
+                  <a:noFill/>
+                </a:ln>
+                <a:solidFill>
+                  <a:schemeClr val="accent2">
+                    <a:lumMod val="60000"/>
+                    <a:lumOff val="40000"/>
+                  </a:schemeClr>
+                </a:solidFill>
+                <a:effectLst/>
+                <a:latin typeface="Chiller" pitchFamily="82" charset="0"/>
+                <a:cs typeface="Arial" pitchFamily="34" charset="0"/>
+              </a:rPr>
+              <a:t>   </a:t>
+            </a:r>
+            <a:r>
+              <a:rPr kumimoji="0" sz="3200" b="0" i="0" u="none" strike="noStrike" cap="none" normalizeH="0" dirty="0" err="1" smtClean="0">
+                <a:ln>
+                  <a:noFill/>
+                </a:ln>
+                <a:solidFill>
+                  <a:schemeClr val="accent2">
+                    <a:lumMod val="60000"/>
+                    <a:lumOff val="40000"/>
+                  </a:schemeClr>
+                </a:solidFill>
+                <a:effectLst/>
+                <a:latin typeface="Chiller" pitchFamily="82" charset="0"/>
+                <a:cs typeface="Arial" pitchFamily="34" charset="0"/>
+              </a:rPr>
+              <a:t>a.k.a</a:t>
+            </a:r>
+            <a:r>
+              <a:rPr kumimoji="0" sz="3200" b="0" i="0" u="none" strike="noStrike" cap="none" normalizeH="0" dirty="0" smtClean="0">
+                <a:ln>
+                  <a:noFill/>
+                </a:ln>
+                <a:solidFill>
+                  <a:schemeClr val="accent2">
+                    <a:lumMod val="60000"/>
+                    <a:lumOff val="40000"/>
+                  </a:schemeClr>
+                </a:solidFill>
+                <a:effectLst/>
+                <a:latin typeface="Chiller" pitchFamily="82" charset="0"/>
+                <a:cs typeface="Arial" pitchFamily="34" charset="0"/>
+              </a:rPr>
+              <a:t> : </a:t>
+            </a:r>
+            <a:r>
+              <a:rPr kumimoji="0" sz="3200" b="0" i="0" u="none" strike="noStrike" cap="none" normalizeH="0" dirty="0" err="1" smtClean="0">
+                <a:ln>
+                  <a:noFill/>
+                </a:ln>
+                <a:solidFill>
+                  <a:schemeClr val="accent2">
+                    <a:lumMod val="60000"/>
+                    <a:lumOff val="40000"/>
+                  </a:schemeClr>
+                </a:solidFill>
+                <a:effectLst/>
+                <a:latin typeface="Chiller" pitchFamily="82" charset="0"/>
+                <a:cs typeface="Arial" pitchFamily="34" charset="0"/>
+              </a:rPr>
+              <a:t>ivantchev</a:t>
+            </a:r>
+            <a:endParaRPr kumimoji="0" sz="3200" b="0" i="0" u="none" strike="noStrike" cap="none" normalizeH="0" dirty="0" smtClean="0">
+              <a:ln>
+                <a:noFill/>
+              </a:ln>
+              <a:solidFill>
+                <a:schemeClr val="accent2">
+                  <a:lumMod val="60000"/>
+                  <a:lumOff val="40000"/>
+                </a:schemeClr>
+              </a:solidFill>
+              <a:effectLst/>
+              <a:latin typeface="Chiller" pitchFamily="82" charset="0"/>
+              <a:cs typeface="Arial" pitchFamily="34" charset="0"/>
+            </a:endParaRPr>
           </a:p>
           <a:p>
             <a:pPr lvl="0" algn="l">
@@ -8889,7 +9102,7 @@
               <a:buSzTx/>
             </a:pPr>
             <a:r>
-              <a:rPr sz="3200" b="0" smtClean="0">
+              <a:rPr sz="3200" b="0" dirty="0" smtClean="0">
                 <a:solidFill>
                   <a:schemeClr val="accent2">
                     <a:lumMod val="60000"/>
@@ -8900,8 +9113,89 @@
                 <a:latin typeface="Chiller" pitchFamily="82" charset="0"/>
                 <a:cs typeface="Arial" pitchFamily="34" charset="0"/>
               </a:rPr>
-              <a:t>Ivan Milushev   a.k.a : IvanMilushev</a:t>
-            </a:r>
+              <a:t>Ivan </a:t>
+            </a:r>
+            <a:r>
+              <a:rPr sz="3200" b="0" dirty="0" err="1" smtClean="0">
+                <a:solidFill>
+                  <a:schemeClr val="accent2">
+                    <a:lumMod val="60000"/>
+                    <a:lumOff val="40000"/>
+                  </a:schemeClr>
+                </a:solidFill>
+                <a:effectLst/>
+                <a:latin typeface="Chiller" pitchFamily="82" charset="0"/>
+                <a:cs typeface="Arial" pitchFamily="34" charset="0"/>
+              </a:rPr>
+              <a:t>Milushev</a:t>
+            </a:r>
+            <a:r>
+              <a:rPr sz="3200" b="0" dirty="0" smtClean="0">
+                <a:solidFill>
+                  <a:schemeClr val="accent2">
+                    <a:lumMod val="60000"/>
+                    <a:lumOff val="40000"/>
+                  </a:schemeClr>
+                </a:solidFill>
+                <a:effectLst/>
+                <a:latin typeface="Chiller" pitchFamily="82" charset="0"/>
+                <a:cs typeface="Arial" pitchFamily="34" charset="0"/>
+              </a:rPr>
+              <a:t>   </a:t>
+            </a:r>
+            <a:r>
+              <a:rPr sz="3200" b="0" dirty="0" err="1" smtClean="0">
+                <a:solidFill>
+                  <a:schemeClr val="accent2">
+                    <a:lumMod val="60000"/>
+                    <a:lumOff val="40000"/>
+                  </a:schemeClr>
+                </a:solidFill>
+                <a:effectLst/>
+                <a:latin typeface="Chiller" pitchFamily="82" charset="0"/>
+                <a:cs typeface="Arial" pitchFamily="34" charset="0"/>
+              </a:rPr>
+              <a:t>a.k.a</a:t>
+            </a:r>
+            <a:r>
+              <a:rPr sz="3200" b="0" dirty="0" smtClean="0">
+                <a:solidFill>
+                  <a:schemeClr val="accent2">
+                    <a:lumMod val="60000"/>
+                    <a:lumOff val="40000"/>
+                  </a:schemeClr>
+                </a:solidFill>
+                <a:effectLst/>
+                <a:latin typeface="Chiller" pitchFamily="82" charset="0"/>
+                <a:cs typeface="Arial" pitchFamily="34" charset="0"/>
+              </a:rPr>
+              <a:t> : </a:t>
+            </a:r>
+            <a:r>
+              <a:rPr sz="3200" b="0" dirty="0" err="1" smtClean="0">
+                <a:solidFill>
+                  <a:schemeClr val="accent2">
+                    <a:lumMod val="60000"/>
+                    <a:lumOff val="40000"/>
+                  </a:schemeClr>
+                </a:solidFill>
+                <a:effectLst/>
+                <a:latin typeface="Chiller" pitchFamily="82" charset="0"/>
+                <a:cs typeface="Arial" pitchFamily="34" charset="0"/>
+              </a:rPr>
+              <a:t>IvanMilushev</a:t>
+            </a:r>
+            <a:endParaRPr sz="3200" b="0" dirty="0" smtClean="0">
+              <a:solidFill>
+                <a:schemeClr val="accent2">
+                  <a:lumMod val="60000"/>
+                  <a:lumOff val="40000"/>
+                </a:schemeClr>
+              </a:solidFill>
+              <a:effectLst/>
+              <a:latin typeface="Chiller" pitchFamily="82" charset="0"/>
+              <a:cs typeface="Arial" pitchFamily="34" charset="0"/>
+            </a:endParaRPr>
           </a:p>
           <a:p>
             <a:pPr lvl="0" algn="l">
@@ -8912,7 +9206,7 @@
               <a:buSzTx/>
             </a:pPr>
             <a:r>
-              <a:rPr kumimoji="0" sz="3200" b="0" i="0" u="none" strike="noStrike" cap="none" normalizeH="0" smtClean="0">
+              <a:rPr kumimoji="0" sz="3200" b="0" i="0" u="none" strike="noStrike" cap="none" normalizeH="0" dirty="0" err="1" smtClean="0">
                 <a:ln>
                   <a:noFill/>
                 </a:ln>
@@ -8926,8 +9220,124 @@
                 <a:latin typeface="Chiller" pitchFamily="82" charset="0"/>
                 <a:cs typeface="Arial" pitchFamily="34" charset="0"/>
               </a:rPr>
-              <a:t>Stanislav Nedelkov a.k.a: whatupp</a:t>
-            </a:r>
+              <a:t>Stanislav</a:t>
+            </a:r>
+            <a:r>
+              <a:rPr kumimoji="0" sz="3200" b="0" i="0" u="none" strike="noStrike" cap="none" normalizeH="0" dirty="0" smtClean="0">
+                <a:ln>
+                  <a:noFill/>
+                </a:ln>
+                <a:solidFill>
+                  <a:schemeClr val="accent2">
+                    <a:lumMod val="60000"/>
+                    <a:lumOff val="40000"/>
+                  </a:schemeClr>
+                </a:solidFill>
+                <a:effectLst/>
+                <a:latin typeface="Chiller" pitchFamily="82" charset="0"/>
+                <a:cs typeface="Arial" pitchFamily="34" charset="0"/>
+              </a:rPr>
+              <a:t> </a:t>
+            </a:r>
+            <a:r>
+              <a:rPr kumimoji="0" sz="3200" b="0" i="0" u="none" strike="noStrike" cap="none" normalizeH="0" dirty="0" err="1" smtClean="0">
+                <a:ln>
+                  <a:noFill/>
+                </a:ln>
+                <a:solidFill>
+                  <a:schemeClr val="accent2">
+                    <a:lumMod val="60000"/>
+                    <a:lumOff val="40000"/>
+                  </a:schemeClr>
+                </a:solidFill>
+                <a:effectLst/>
+                <a:latin typeface="Chiller" pitchFamily="82" charset="0"/>
+                <a:cs typeface="Arial" pitchFamily="34" charset="0"/>
+              </a:rPr>
+              <a:t>Nedelkov</a:t>
+            </a:r>
+            <a:r>
+              <a:rPr kumimoji="0" sz="3200" b="0" i="0" u="none" strike="noStrike" cap="none" normalizeH="0" dirty="0" smtClean="0">
+                <a:ln>
+                  <a:noFill/>
+                </a:ln>
+                <a:solidFill>
+                  <a:schemeClr val="accent2">
+                    <a:lumMod val="60000"/>
+                    <a:lumOff val="40000"/>
+                  </a:schemeClr>
+                </a:solidFill>
+                <a:effectLst/>
+                <a:latin typeface="Chiller" pitchFamily="82" charset="0"/>
+                <a:cs typeface="Arial" pitchFamily="34" charset="0"/>
+              </a:rPr>
+              <a:t> </a:t>
+            </a:r>
+            <a:r>
+              <a:rPr kumimoji="0" sz="3200" b="0" i="0" u="none" strike="noStrike" cap="none" normalizeH="0" dirty="0" err="1" smtClean="0">
+                <a:ln>
+                  <a:noFill/>
+                </a:ln>
+                <a:solidFill>
+                  <a:schemeClr val="accent2">
+                    <a:lumMod val="60000"/>
+                    <a:lumOff val="40000"/>
+                  </a:schemeClr>
+                </a:solidFill>
+                <a:effectLst/>
+                <a:latin typeface="Chiller" pitchFamily="82" charset="0"/>
+                <a:cs typeface="Arial" pitchFamily="34" charset="0"/>
+              </a:rPr>
+              <a:t>a.k.a</a:t>
+            </a:r>
+            <a:r>
+              <a:rPr kumimoji="0" sz="3200" b="0" i="0" u="none" strike="noStrike" cap="none" normalizeH="0" dirty="0" smtClean="0">
+                <a:ln>
+                  <a:noFill/>
+                </a:ln>
+                <a:solidFill>
+                  <a:schemeClr val="accent2">
+                    <a:lumMod val="60000"/>
+                    <a:lumOff val="40000"/>
+                  </a:schemeClr>
+                </a:solidFill>
+                <a:effectLst/>
+                <a:latin typeface="Chiller" pitchFamily="82" charset="0"/>
+                <a:cs typeface="Arial" pitchFamily="34" charset="0"/>
+              </a:rPr>
+              <a:t>: </a:t>
+            </a:r>
+            <a:r>
+              <a:rPr kumimoji="0" sz="3200" b="0" i="0" u="none" strike="noStrike" cap="none" normalizeH="0" dirty="0" err="1" smtClean="0">
+                <a:ln>
+                  <a:noFill/>
+                </a:ln>
+                <a:solidFill>
+                  <a:schemeClr val="accent2">
+                    <a:lumMod val="60000"/>
+                    <a:lumOff val="40000"/>
+                  </a:schemeClr>
+                </a:solidFill>
+                <a:effectLst/>
+                <a:latin typeface="Chiller" pitchFamily="82" charset="0"/>
+                <a:cs typeface="Arial" pitchFamily="34" charset="0"/>
+              </a:rPr>
+              <a:t>whatupp</a:t>
+            </a:r>
+            <a:endParaRPr kumimoji="0" sz="3200" b="0" i="0" u="none" strike="noStrike" cap="none" normalizeH="0" dirty="0" smtClean="0">
+              <a:ln>
+                <a:noFill/>
+              </a:ln>
+              <a:solidFill>
+                <a:schemeClr val="accent2">
+                  <a:lumMod val="60000"/>
+                  <a:lumOff val="40000"/>
+                </a:schemeClr>
+              </a:solidFill>
+              <a:effectLst/>
+              <a:latin typeface="Chiller" pitchFamily="82" charset="0"/>
+              <a:cs typeface="Arial" pitchFamily="34" charset="0"/>
+            </a:endParaRPr>
           </a:p>
           <a:p>
             <a:pPr lvl="0" algn="l">
@@ -8938,7 +9348,7 @@
               <a:buSzTx/>
             </a:pPr>
             <a:r>
-              <a:rPr sz="3200" b="0" smtClean="0">
+              <a:rPr sz="3200" b="0" dirty="0" err="1" smtClean="0">
                 <a:solidFill>
                   <a:schemeClr val="accent2">
                     <a:lumMod val="60000"/>
@@ -8949,9 +9359,65 @@
                 <a:latin typeface="Chiller" pitchFamily="82" charset="0"/>
                 <a:cs typeface="Arial" pitchFamily="34" charset="0"/>
               </a:rPr>
-              <a:t>Radoy Zhekov     a.k.a: koparfild</a:t>
-            </a:r>
-            <a:endParaRPr kumimoji="0" sz="3200" b="0" i="0" u="none" strike="noStrike" cap="none" normalizeH="0" smtClean="0">
+              <a:t>Radoy</a:t>
+            </a:r>
+            <a:r>
+              <a:rPr sz="3200" b="0" dirty="0" smtClean="0">
+                <a:solidFill>
+                  <a:schemeClr val="accent2">
+                    <a:lumMod val="60000"/>
+                    <a:lumOff val="40000"/>
+                  </a:schemeClr>
+                </a:solidFill>
+                <a:effectLst/>
+                <a:latin typeface="Chiller" pitchFamily="82" charset="0"/>
+                <a:cs typeface="Arial" pitchFamily="34" charset="0"/>
+              </a:rPr>
+              <a:t> Zhekov     </a:t>
+            </a:r>
+            <a:r>
+              <a:rPr sz="3200" b="0" dirty="0" err="1" smtClean="0">
+                <a:solidFill>
+                  <a:schemeClr val="accent2">
+                    <a:lumMod val="60000"/>
+                    <a:lumOff val="40000"/>
+                  </a:schemeClr>
+                </a:solidFill>
+                <a:effectLst/>
+                <a:latin typeface="Chiller" pitchFamily="82" charset="0"/>
+                <a:cs typeface="Arial" pitchFamily="34" charset="0"/>
+              </a:rPr>
+              <a:t>a.k.a</a:t>
+            </a:r>
+            <a:r>
+              <a:rPr sz="3200" b="0" dirty="0" smtClean="0">
+                <a:solidFill>
+                  <a:schemeClr val="accent2">
+                    <a:lumMod val="60000"/>
+                    <a:lumOff val="40000"/>
+                  </a:schemeClr>
+                </a:solidFill>
+                <a:effectLst/>
+                <a:latin typeface="Chiller" pitchFamily="82" charset="0"/>
+                <a:cs typeface="Arial" pitchFamily="34" charset="0"/>
+              </a:rPr>
+              <a:t>: </a:t>
+            </a:r>
+            <a:r>
+              <a:rPr sz="3200" b="0" dirty="0" err="1" smtClean="0">
+                <a:solidFill>
+                  <a:schemeClr val="accent2">
+                    <a:lumMod val="60000"/>
+                    <a:lumOff val="40000"/>
+                  </a:schemeClr>
+                </a:solidFill>
+                <a:effectLst/>
+                <a:latin typeface="Chiller" pitchFamily="82" charset="0"/>
+                <a:cs typeface="Arial" pitchFamily="34" charset="0"/>
+              </a:rPr>
+              <a:t>koparfild</a:t>
+            </a:r>
+            <a:endParaRPr kumimoji="0" sz="3200" b="0" i="0" u="none" strike="noStrike" cap="none" normalizeH="0" dirty="0" smtClean="0">
               <a:ln>
                 <a:noFill/>
               </a:ln>
@@ -8975,7 +9441,7 @@
               <a:buSzTx/>
             </a:pPr>
             <a:r>
-              <a:rPr sz="3200" smtClean="0">
+              <a:rPr sz="3200" dirty="0" smtClean="0">
                 <a:solidFill>
                   <a:srgbClr val="FF0000"/>
                 </a:solidFill>
@@ -8985,12 +9451,13 @@
               <a:t>URL: </a:t>
             </a:r>
             <a:r>
-              <a:rPr sz="3200" u="sng" smtClean="0">
+              <a:rPr sz="3200" u="sng" dirty="0" smtClean="0">
                 <a:solidFill>
                   <a:srgbClr val="FF0000"/>
                 </a:solidFill>
                 <a:effectLst/>
                 <a:latin typeface="Chiller" pitchFamily="82" charset="0"/>
+                <a:hlinkClick r:id="rId4"/>
               </a:rPr>
               <a:t>https://github.com/ArchDevilCSharp2/Team-Work---Console-Game-Arch-Devil</a:t>
             </a:r>
@@ -9071,7 +9538,7 @@
           <p:nvPr/>
         </p:nvPicPr>
         <p:blipFill>
-          <a:blip r:embed="rId4" cstate="print"/>
+          <a:blip r:embed="rId5" cstate="print"/>
           <a:srcRect/>
           <a:stretch>
             <a:fillRect/>
@@ -9091,7 +9558,7 @@
     </p:spTree>
     <p:extLst>
       <p:ext uri="{BB962C8B-B14F-4D97-AF65-F5344CB8AC3E}">
-        <p14:creationId xmlns:p14="http://schemas.microsoft.com/office/powerpoint/2010/main" xmlns="" val="3861154471"/>
+        <p14:creationId xmlns="" xmlns:p14="http://schemas.microsoft.com/office/powerpoint/2010/main" val="3861154471"/>
       </p:ext>
     </p:extLst>
   </p:cSld>
@@ -9196,7 +9663,7 @@
           <a:p>
             <a:pPr algn="l"/>
             <a:r>
-              <a:rPr sz="3200" smtClean="0">
+              <a:rPr sz="3200" dirty="0" smtClean="0">
                 <a:solidFill>
                   <a:schemeClr val="accent2">
                     <a:lumMod val="60000"/>
@@ -9205,13 +9672,10 @@
                 </a:solidFill>
                 <a:latin typeface="Chiller" pitchFamily="82" charset="0"/>
               </a:rPr>
-              <a:t>Five-card Draw is a poker variant that is considered as the simpliest variant of apoker game. You play single-player.  Start with 100 coins and you can bet from 1 to 10 coins.</a:t>
-            </a:r>
-          </a:p>
-          <a:p>
-            <a:pPr algn="l"/>
-            <a:r>
-              <a:rPr sz="3200" smtClean="0">
+              <a:t>Five-card Draw is a poker variant that is considered as the </a:t>
+            </a:r>
+            <a:r>
+              <a:rPr sz="3200" dirty="0" err="1" smtClean="0">
                 <a:solidFill>
                   <a:schemeClr val="accent2">
                     <a:lumMod val="60000"/>
@@ -9220,7 +9684,94 @@
                 </a:solidFill>
                 <a:latin typeface="Chiller" pitchFamily="82" charset="0"/>
               </a:rPr>
-              <a:t>Then draw 5 cards. You can hold any card. The rest cards draw again (with new cards).</a:t>
+              <a:t>simpliest</a:t>
+            </a:r>
+            <a:r>
+              <a:rPr sz="3200" dirty="0" smtClean="0">
+                <a:solidFill>
+                  <a:schemeClr val="accent2">
+                    <a:lumMod val="60000"/>
+                    <a:lumOff val="40000"/>
+                  </a:schemeClr>
+                </a:solidFill>
+                <a:latin typeface="Chiller" pitchFamily="82" charset="0"/>
+              </a:rPr>
+              <a:t> variant </a:t>
+            </a:r>
+            <a:r>
+              <a:rPr sz="3200" dirty="0" smtClean="0">
+                <a:solidFill>
+                  <a:schemeClr val="accent2">
+                    <a:lumMod val="60000"/>
+                    <a:lumOff val="40000"/>
+                  </a:schemeClr>
+                </a:solidFill>
+                <a:latin typeface="Chiller" pitchFamily="82" charset="0"/>
+              </a:rPr>
+              <a:t>of poker </a:t>
+            </a:r>
+            <a:r>
+              <a:rPr sz="3200" dirty="0" smtClean="0">
+                <a:solidFill>
+                  <a:schemeClr val="accent2">
+                    <a:lumMod val="60000"/>
+                    <a:lumOff val="40000"/>
+                  </a:schemeClr>
+                </a:solidFill>
+                <a:latin typeface="Chiller" pitchFamily="82" charset="0"/>
+              </a:rPr>
+              <a:t>game. You play single-player.  Start with 100 coins and you can bet from 1 to 10 coins.</a:t>
+            </a:r>
+          </a:p>
+          <a:p>
+            <a:pPr algn="l"/>
+            <a:r>
+              <a:rPr sz="3200" dirty="0" smtClean="0">
+                <a:solidFill>
+                  <a:schemeClr val="accent2">
+                    <a:lumMod val="60000"/>
+                    <a:lumOff val="40000"/>
+                  </a:schemeClr>
+                </a:solidFill>
+                <a:latin typeface="Chiller" pitchFamily="82" charset="0"/>
+              </a:rPr>
+              <a:t>Then draw 5 cards. You can hold any card. The rest cards </a:t>
+            </a:r>
+            <a:r>
+              <a:rPr sz="3200" dirty="0" smtClean="0">
+                <a:solidFill>
+                  <a:schemeClr val="accent2">
+                    <a:lumMod val="60000"/>
+                    <a:lumOff val="40000"/>
+                  </a:schemeClr>
+                </a:solidFill>
+                <a:latin typeface="Chiller" pitchFamily="82" charset="0"/>
+              </a:rPr>
+              <a:t>redraw </a:t>
+            </a:r>
+            <a:r>
+              <a:rPr sz="3200" dirty="0" smtClean="0">
+                <a:solidFill>
+                  <a:schemeClr val="accent2">
+                    <a:lumMod val="60000"/>
+                    <a:lumOff val="40000"/>
+                  </a:schemeClr>
+                </a:solidFill>
+                <a:latin typeface="Chiller" pitchFamily="82" charset="0"/>
+              </a:rPr>
+              <a:t>again (with new </a:t>
+            </a:r>
+            <a:r>
+              <a:rPr sz="3200" dirty="0" smtClean="0">
+                <a:solidFill>
+                  <a:schemeClr val="accent2">
+                    <a:lumMod val="60000"/>
+                    <a:lumOff val="40000"/>
+                  </a:schemeClr>
+                </a:solidFill>
+                <a:latin typeface="Chiller" pitchFamily="82" charset="0"/>
+              </a:rPr>
+              <a:t>cards from the deck).</a:t>
             </a:r>
             <a:endParaRPr lang="bg-BG" sz="3200" dirty="0" smtClean="0">
               <a:solidFill>
@@ -9265,7 +9816,7 @@
     </p:spTree>
     <p:extLst>
       <p:ext uri="{BB962C8B-B14F-4D97-AF65-F5344CB8AC3E}">
-        <p14:creationId xmlns:p14="http://schemas.microsoft.com/office/powerpoint/2010/main" xmlns="" val="3861154471"/>
+        <p14:creationId xmlns="" xmlns:p14="http://schemas.microsoft.com/office/powerpoint/2010/main" val="3861154471"/>
       </p:ext>
     </p:extLst>
   </p:cSld>
@@ -9644,7 +10195,7 @@
     </p:spTree>
     <p:extLst>
       <p:ext uri="{BB962C8B-B14F-4D97-AF65-F5344CB8AC3E}">
-        <p14:creationId xmlns:p14="http://schemas.microsoft.com/office/powerpoint/2010/main" xmlns="" val="3861154471"/>
+        <p14:creationId xmlns="" xmlns:p14="http://schemas.microsoft.com/office/powerpoint/2010/main" val="3861154471"/>
       </p:ext>
     </p:extLst>
   </p:cSld>
@@ -10032,7 +10583,7 @@
     </p:spTree>
     <p:extLst>
       <p:ext uri="{BB962C8B-B14F-4D97-AF65-F5344CB8AC3E}">
-        <p14:creationId xmlns:p14="http://schemas.microsoft.com/office/powerpoint/2010/main" xmlns="" val="3861154471"/>
+        <p14:creationId xmlns="" xmlns:p14="http://schemas.microsoft.com/office/powerpoint/2010/main" val="3861154471"/>
       </p:ext>
     </p:extLst>
   </p:cSld>
@@ -10357,7 +10908,7 @@
     </p:spTree>
     <p:extLst>
       <p:ext uri="{BB962C8B-B14F-4D97-AF65-F5344CB8AC3E}">
-        <p14:creationId xmlns:p14="http://schemas.microsoft.com/office/powerpoint/2010/main" xmlns="" val="3861154471"/>
+        <p14:creationId xmlns="" xmlns:p14="http://schemas.microsoft.com/office/powerpoint/2010/main" val="3861154471"/>
       </p:ext>
     </p:extLst>
   </p:cSld>
@@ -10563,7 +11114,7 @@
     </p:spTree>
     <p:extLst>
       <p:ext uri="{BB962C8B-B14F-4D97-AF65-F5344CB8AC3E}">
-        <p14:creationId xmlns:p14="http://schemas.microsoft.com/office/powerpoint/2010/main" xmlns="" val="3861154471"/>
+        <p14:creationId xmlns="" xmlns:p14="http://schemas.microsoft.com/office/powerpoint/2010/main" val="3861154471"/>
       </p:ext>
     </p:extLst>
   </p:cSld>
@@ -10825,7 +11376,7 @@
     </p:spTree>
     <p:extLst>
       <p:ext uri="{BB962C8B-B14F-4D97-AF65-F5344CB8AC3E}">
-        <p14:creationId xmlns:p14="http://schemas.microsoft.com/office/powerpoint/2010/main" xmlns="" val="3861154471"/>
+        <p14:creationId xmlns="" xmlns:p14="http://schemas.microsoft.com/office/powerpoint/2010/main" val="3861154471"/>
       </p:ext>
     </p:extLst>
   </p:cSld>
@@ -11082,7 +11633,7 @@
     </p:spTree>
     <p:extLst>
       <p:ext uri="{BB962C8B-B14F-4D97-AF65-F5344CB8AC3E}">
-        <p14:creationId xmlns:p14="http://schemas.microsoft.com/office/powerpoint/2010/main" xmlns="" val="3861154471"/>
+        <p14:creationId xmlns="" xmlns:p14="http://schemas.microsoft.com/office/powerpoint/2010/main" val="3861154471"/>
       </p:ext>
     </p:extLst>
   </p:cSld>
@@ -11392,7 +11943,7 @@
     </p:spTree>
     <p:extLst>
       <p:ext uri="{BB962C8B-B14F-4D97-AF65-F5344CB8AC3E}">
-        <p14:creationId xmlns:p14="http://schemas.microsoft.com/office/powerpoint/2010/main" xmlns="" val="3861154471"/>
+        <p14:creationId xmlns="" xmlns:p14="http://schemas.microsoft.com/office/powerpoint/2010/main" val="3861154471"/>
       </p:ext>
     </p:extLst>
   </p:cSld>

</xml_diff>